<commit_message>
Added iphone network docs
</commit_message>
<xml_diff>
--- a/FINAL_presentation_iphone_galaxy.pptx
+++ b/FINAL_presentation_iphone_galaxy.pptx
@@ -130,10 +130,6 @@
 </p:presentation>
 </file>
 
-<file path=ppt/revisionInfo.xml><?xml version="1.0" encoding="utf-8"?>
-<p1510:revInfo xmlns:a="http://schemas.openxmlformats.org/drawingml/2006/main" xmlns:r="http://schemas.openxmlformats.org/officeDocument/2006/relationships" xmlns:p1510="http://schemas.microsoft.com/office/powerpoint/2015/10/main"/>
-</file>
-
 <file path=ppt/handoutMasters/handoutMaster1.xml><?xml version="1.0" encoding="utf-8"?>
 <p:handoutMaster xmlns:a="http://schemas.openxmlformats.org/drawingml/2006/main" xmlns:r="http://schemas.openxmlformats.org/officeDocument/2006/relationships" xmlns:p="http://schemas.openxmlformats.org/presentationml/2006/main">
   <p:cSld>
@@ -216,7 +212,7 @@
           <a:p>
             <a:fld id="{2BCAFC7A-71DD-4C2C-B63D-60FDC7DD5449}" type="datetimeFigureOut">
               <a:rPr lang="en-US" smtClean="0"/>
-              <a:t>5/3/2018</a:t>
+              <a:t>5/4/2018</a:t>
             </a:fld>
             <a:endParaRPr lang="en-US"/>
           </a:p>
@@ -381,7 +377,7 @@
           <a:p>
             <a:fld id="{D85ECAFD-F005-4163-B10D-85806DC43F93}" type="datetimeFigureOut">
               <a:rPr lang="en-US" smtClean="0"/>
-              <a:t>5/3/2018</a:t>
+              <a:t>5/4/2018</a:t>
             </a:fld>
             <a:endParaRPr lang="en-US"/>
           </a:p>
@@ -1006,7 +1002,7 @@
           <a:p>
             <a:fld id="{4AAD347D-5ACD-4C99-B74B-A9C85AD731AF}" type="datetimeFigureOut">
               <a:rPr lang="en-US" smtClean="0"/>
-              <a:t>5/3/2018</a:t>
+              <a:t>5/4/2018</a:t>
             </a:fld>
             <a:endParaRPr lang="en-US"/>
           </a:p>
@@ -1278,7 +1274,7 @@
           <a:p>
             <a:fld id="{4509A250-FF31-4206-8172-F9D3106AACB1}" type="datetimeFigureOut">
               <a:rPr lang="en-US" smtClean="0"/>
-              <a:t>5/3/2018</a:t>
+              <a:t>5/4/2018</a:t>
             </a:fld>
             <a:endParaRPr lang="en-US" dirty="0"/>
           </a:p>
@@ -1469,7 +1465,7 @@
           <a:p>
             <a:fld id="{4509A250-FF31-4206-8172-F9D3106AACB1}" type="datetimeFigureOut">
               <a:rPr lang="en-US" smtClean="0"/>
-              <a:t>5/3/2018</a:t>
+              <a:t>5/4/2018</a:t>
             </a:fld>
             <a:endParaRPr lang="en-US" dirty="0"/>
           </a:p>
@@ -1801,7 +1797,7 @@
           <a:p>
             <a:fld id="{4509A250-FF31-4206-8172-F9D3106AACB1}" type="datetimeFigureOut">
               <a:rPr lang="en-US" smtClean="0"/>
-              <a:t>5/3/2018</a:t>
+              <a:t>5/4/2018</a:t>
             </a:fld>
             <a:endParaRPr lang="en-US" dirty="0"/>
           </a:p>
@@ -2046,7 +2042,7 @@
           <a:p>
             <a:fld id="{4509A250-FF31-4206-8172-F9D3106AACB1}" type="datetimeFigureOut">
               <a:rPr lang="en-US" smtClean="0"/>
-              <a:t>5/3/2018</a:t>
+              <a:t>5/4/2018</a:t>
             </a:fld>
             <a:endParaRPr lang="en-US" dirty="0"/>
           </a:p>
@@ -2341,7 +2337,7 @@
           <a:p>
             <a:fld id="{4509A250-FF31-4206-8172-F9D3106AACB1}" type="datetimeFigureOut">
               <a:rPr lang="en-US" smtClean="0"/>
-              <a:t>5/3/2018</a:t>
+              <a:t>5/4/2018</a:t>
             </a:fld>
             <a:endParaRPr lang="en-US" dirty="0"/>
           </a:p>
@@ -2609,7 +2605,7 @@
           <a:p>
             <a:fld id="{4509A250-FF31-4206-8172-F9D3106AACB1}" type="datetimeFigureOut">
               <a:rPr lang="en-US" smtClean="0"/>
-              <a:t>5/3/2018</a:t>
+              <a:t>5/4/2018</a:t>
             </a:fld>
             <a:endParaRPr lang="en-US" dirty="0"/>
           </a:p>
@@ -3230,7 +3226,7 @@
           <a:p>
             <a:fld id="{4509A250-FF31-4206-8172-F9D3106AACB1}" type="datetimeFigureOut">
               <a:rPr lang="en-US" smtClean="0"/>
-              <a:t>5/3/2018</a:t>
+              <a:t>5/4/2018</a:t>
             </a:fld>
             <a:endParaRPr lang="en-US" dirty="0"/>
           </a:p>
@@ -4087,7 +4083,7 @@
           <a:p>
             <a:fld id="{4509A250-FF31-4206-8172-F9D3106AACB1}" type="datetimeFigureOut">
               <a:rPr lang="en-US" smtClean="0"/>
-              <a:t>5/3/2018</a:t>
+              <a:t>5/4/2018</a:t>
             </a:fld>
             <a:endParaRPr lang="en-US" dirty="0"/>
           </a:p>
@@ -4254,7 +4250,7 @@
           <a:p>
             <a:fld id="{4509A250-FF31-4206-8172-F9D3106AACB1}" type="datetimeFigureOut">
               <a:rPr lang="en-US" smtClean="0"/>
-              <a:t>5/3/2018</a:t>
+              <a:t>5/4/2018</a:t>
             </a:fld>
             <a:endParaRPr lang="en-US" dirty="0"/>
           </a:p>
@@ -4431,7 +4427,7 @@
           <a:p>
             <a:fld id="{4509A250-FF31-4206-8172-F9D3106AACB1}" type="datetimeFigureOut">
               <a:rPr lang="en-US" smtClean="0"/>
-              <a:t>5/3/2018</a:t>
+              <a:t>5/4/2018</a:t>
             </a:fld>
             <a:endParaRPr lang="en-US" dirty="0"/>
           </a:p>
@@ -4598,7 +4594,7 @@
           <a:p>
             <a:fld id="{4509A250-FF31-4206-8172-F9D3106AACB1}" type="datetimeFigureOut">
               <a:rPr lang="en-US" smtClean="0"/>
-              <a:t>5/3/2018</a:t>
+              <a:t>5/4/2018</a:t>
             </a:fld>
             <a:endParaRPr lang="en-US" dirty="0"/>
           </a:p>
@@ -4843,7 +4839,7 @@
           <a:p>
             <a:fld id="{9796027F-7875-4030-9381-8BD8C4F21935}" type="datetimeFigureOut">
               <a:rPr lang="en-US" smtClean="0"/>
-              <a:t>5/3/2018</a:t>
+              <a:t>5/4/2018</a:t>
             </a:fld>
             <a:endParaRPr lang="en-US"/>
           </a:p>
@@ -5130,7 +5126,7 @@
           <a:p>
             <a:fld id="{9796027F-7875-4030-9381-8BD8C4F21935}" type="datetimeFigureOut">
               <a:rPr lang="en-US" smtClean="0"/>
-              <a:t>5/3/2018</a:t>
+              <a:t>5/4/2018</a:t>
             </a:fld>
             <a:endParaRPr lang="en-US"/>
           </a:p>
@@ -5569,7 +5565,7 @@
           <a:p>
             <a:fld id="{9796027F-7875-4030-9381-8BD8C4F21935}" type="datetimeFigureOut">
               <a:rPr lang="en-US" smtClean="0"/>
-              <a:t>5/3/2018</a:t>
+              <a:t>5/4/2018</a:t>
             </a:fld>
             <a:endParaRPr lang="en-US"/>
           </a:p>
@@ -5684,7 +5680,7 @@
           <a:p>
             <a:fld id="{4509A250-FF31-4206-8172-F9D3106AACB1}" type="datetimeFigureOut">
               <a:rPr lang="en-US" smtClean="0"/>
-              <a:t>5/3/2018</a:t>
+              <a:t>5/4/2018</a:t>
             </a:fld>
             <a:endParaRPr lang="en-US" dirty="0"/>
           </a:p>
@@ -5777,7 +5773,7 @@
           <a:p>
             <a:fld id="{4509A250-FF31-4206-8172-F9D3106AACB1}" type="datetimeFigureOut">
               <a:rPr lang="en-US" smtClean="0"/>
-              <a:t>5/3/2018</a:t>
+              <a:t>5/4/2018</a:t>
             </a:fld>
             <a:endParaRPr lang="en-US" dirty="0"/>
           </a:p>
@@ -6053,7 +6049,7 @@
           <a:p>
             <a:fld id="{4509A250-FF31-4206-8172-F9D3106AACB1}" type="datetimeFigureOut">
               <a:rPr lang="en-US" smtClean="0"/>
-              <a:t>5/3/2018</a:t>
+              <a:t>5/4/2018</a:t>
             </a:fld>
             <a:endParaRPr lang="en-US" dirty="0"/>
           </a:p>
@@ -6325,7 +6321,7 @@
           <a:p>
             <a:fld id="{4509A250-FF31-4206-8172-F9D3106AACB1}" type="datetimeFigureOut">
               <a:rPr lang="en-US" smtClean="0"/>
-              <a:t>5/3/2018</a:t>
+              <a:t>5/4/2018</a:t>
             </a:fld>
             <a:endParaRPr lang="en-US" dirty="0"/>
           </a:p>
@@ -6722,7 +6718,7 @@
             <a:fld id="{4AAD347D-5ACD-4C99-B74B-A9C85AD731AF}" type="datetimeFigureOut">
               <a:rPr lang="en-US" smtClean="0"/>
               <a:pPr/>
-              <a:t>5/3/2018</a:t>
+              <a:t>5/4/2018</a:t>
             </a:fld>
             <a:endParaRPr lang="en-US" dirty="0"/>
           </a:p>
@@ -7318,7 +7314,7 @@
             <a:pPr algn="ctr"/>
             <a:r>
               <a:rPr lang="en-US" sz="6000" dirty="0"/>
-              <a:t>iPhone vs Galaxy S9</a:t>
+              <a:t>iPhone X vs Galaxy S9</a:t>
             </a:r>
           </a:p>
         </p:txBody>
@@ -8817,28 +8813,416 @@
           </a:p>
         </p:txBody>
       </p:sp>
-      <p:sp>
-        <p:nvSpPr>
-          <p:cNvPr id="3" name="Content Placeholder 2">
+      <p:pic>
+        <p:nvPicPr>
+          <p:cNvPr id="5" name="Content Placeholder 4">
             <a:extLst>
               <a:ext uri="{FF2B5EF4-FFF2-40B4-BE49-F238E27FC236}">
-                <a16:creationId xmlns:a16="http://schemas.microsoft.com/office/drawing/2014/main" id="{20D9E96E-60AF-4785-BCC9-3CEDC8170F82}"/>
+                <a16:creationId xmlns:a16="http://schemas.microsoft.com/office/drawing/2014/main" id="{11F931B9-7B18-4E24-A16B-D6D60924F7A5}"/>
               </a:ext>
             </a:extLst>
           </p:cNvPr>
-          <p:cNvSpPr>
-            <a:spLocks noGrp="1"/>
-          </p:cNvSpPr>
+          <p:cNvPicPr>
+            <a:picLocks noGrp="1" noChangeAspect="1"/>
+          </p:cNvPicPr>
           <p:nvPr>
             <p:ph idx="1"/>
           </p:nvPr>
-        </p:nvSpPr>
-        <p:spPr/>
-        <p:txBody>
-          <a:bodyPr/>
-          <a:lstStyle/>
-          <a:p>
-            <a:endParaRPr lang="en-US"/>
+        </p:nvPicPr>
+        <p:blipFill>
+          <a:blip r:embed="rId2"/>
+          <a:stretch>
+            <a:fillRect/>
+          </a:stretch>
+        </p:blipFill>
+        <p:spPr>
+          <a:xfrm>
+            <a:off x="6017229" y="2057644"/>
+            <a:ext cx="5358752" cy="4195762"/>
+          </a:xfrm>
+        </p:spPr>
+      </p:pic>
+      <p:sp>
+        <p:nvSpPr>
+          <p:cNvPr id="7" name="Content Placeholder 2">
+            <a:extLst>
+              <a:ext uri="{FF2B5EF4-FFF2-40B4-BE49-F238E27FC236}">
+                <a16:creationId xmlns:a16="http://schemas.microsoft.com/office/drawing/2014/main" id="{A6486E85-418F-4460-8F44-82B4BE3743F7}"/>
+              </a:ext>
+            </a:extLst>
+          </p:cNvPr>
+          <p:cNvSpPr txBox="1">
+            <a:spLocks/>
+          </p:cNvSpPr>
+          <p:nvPr/>
+        </p:nvSpPr>
+        <p:spPr>
+          <a:xfrm>
+            <a:off x="816019" y="2039061"/>
+            <a:ext cx="4396339" cy="4195763"/>
+          </a:xfrm>
+          <a:prstGeom prst="rect">
+            <a:avLst/>
+          </a:prstGeom>
+        </p:spPr>
+        <p:txBody>
+          <a:bodyPr vert="horz" lIns="91440" tIns="45720" rIns="91440" bIns="45720" rtlCol="0">
+            <a:normAutofit/>
+          </a:bodyPr>
+          <a:lstStyle>
+            <a:lvl1pPr marL="342900" indent="-342900" algn="l" defTabSz="457200" rtl="0" eaLnBrk="1" latinLnBrk="0" hangingPunct="1">
+              <a:spcBef>
+                <a:spcPts val="1000"/>
+              </a:spcBef>
+              <a:spcAft>
+                <a:spcPts val="0"/>
+              </a:spcAft>
+              <a:buClr>
+                <a:schemeClr val="bg2">
+                  <a:lumMod val="40000"/>
+                  <a:lumOff val="60000"/>
+                </a:schemeClr>
+              </a:buClr>
+              <a:buSzPct val="80000"/>
+              <a:buFont typeface="Wingdings 3" charset="2"/>
+              <a:buChar char=""/>
+              <a:defRPr sz="2000" b="0" i="0" kern="1200">
+                <a:solidFill>
+                  <a:schemeClr val="tx1"/>
+                </a:solidFill>
+                <a:latin typeface="+mj-lt"/>
+                <a:ea typeface="+mj-ea"/>
+                <a:cs typeface="+mj-cs"/>
+              </a:defRPr>
+            </a:lvl1pPr>
+            <a:lvl2pPr marL="742950" indent="-285750" algn="l" defTabSz="457200" rtl="0" eaLnBrk="1" latinLnBrk="0" hangingPunct="1">
+              <a:spcBef>
+                <a:spcPts val="1000"/>
+              </a:spcBef>
+              <a:spcAft>
+                <a:spcPts val="0"/>
+              </a:spcAft>
+              <a:buClr>
+                <a:schemeClr val="bg2">
+                  <a:lumMod val="40000"/>
+                  <a:lumOff val="60000"/>
+                </a:schemeClr>
+              </a:buClr>
+              <a:buSzPct val="80000"/>
+              <a:buFont typeface="Wingdings 3" charset="2"/>
+              <a:buChar char=""/>
+              <a:defRPr sz="1800" b="0" i="0" kern="1200">
+                <a:solidFill>
+                  <a:schemeClr val="tx1"/>
+                </a:solidFill>
+                <a:latin typeface="+mj-lt"/>
+                <a:ea typeface="+mj-ea"/>
+                <a:cs typeface="+mj-cs"/>
+              </a:defRPr>
+            </a:lvl2pPr>
+            <a:lvl3pPr marL="1143000" indent="-228600" algn="l" defTabSz="457200" rtl="0" eaLnBrk="1" latinLnBrk="0" hangingPunct="1">
+              <a:spcBef>
+                <a:spcPts val="1000"/>
+              </a:spcBef>
+              <a:spcAft>
+                <a:spcPts val="0"/>
+              </a:spcAft>
+              <a:buClr>
+                <a:schemeClr val="bg2">
+                  <a:lumMod val="40000"/>
+                  <a:lumOff val="60000"/>
+                </a:schemeClr>
+              </a:buClr>
+              <a:buSzPct val="80000"/>
+              <a:buFont typeface="Wingdings 3" charset="2"/>
+              <a:buChar char=""/>
+              <a:defRPr sz="1600" b="0" i="0" kern="1200">
+                <a:solidFill>
+                  <a:schemeClr val="tx1"/>
+                </a:solidFill>
+                <a:latin typeface="+mj-lt"/>
+                <a:ea typeface="+mj-ea"/>
+                <a:cs typeface="+mj-cs"/>
+              </a:defRPr>
+            </a:lvl3pPr>
+            <a:lvl4pPr marL="1600200" indent="-228600" algn="l" defTabSz="457200" rtl="0" eaLnBrk="1" latinLnBrk="0" hangingPunct="1">
+              <a:spcBef>
+                <a:spcPts val="1000"/>
+              </a:spcBef>
+              <a:spcAft>
+                <a:spcPts val="0"/>
+              </a:spcAft>
+              <a:buClr>
+                <a:schemeClr val="bg2">
+                  <a:lumMod val="40000"/>
+                  <a:lumOff val="60000"/>
+                </a:schemeClr>
+              </a:buClr>
+              <a:buSzPct val="80000"/>
+              <a:buFont typeface="Wingdings 3" charset="2"/>
+              <a:buChar char=""/>
+              <a:defRPr sz="1400" b="0" i="0" kern="1200">
+                <a:solidFill>
+                  <a:schemeClr val="tx1"/>
+                </a:solidFill>
+                <a:latin typeface="+mj-lt"/>
+                <a:ea typeface="+mj-ea"/>
+                <a:cs typeface="+mj-cs"/>
+              </a:defRPr>
+            </a:lvl4pPr>
+            <a:lvl5pPr marL="2057400" indent="-228600" algn="l" defTabSz="457200" rtl="0" eaLnBrk="1" latinLnBrk="0" hangingPunct="1">
+              <a:spcBef>
+                <a:spcPts val="1000"/>
+              </a:spcBef>
+              <a:spcAft>
+                <a:spcPts val="0"/>
+              </a:spcAft>
+              <a:buClr>
+                <a:schemeClr val="bg2">
+                  <a:lumMod val="40000"/>
+                  <a:lumOff val="60000"/>
+                </a:schemeClr>
+              </a:buClr>
+              <a:buSzPct val="80000"/>
+              <a:buFont typeface="Wingdings 3" charset="2"/>
+              <a:buChar char=""/>
+              <a:defRPr sz="1400" b="0" i="0" kern="1200">
+                <a:solidFill>
+                  <a:schemeClr val="tx1"/>
+                </a:solidFill>
+                <a:latin typeface="+mj-lt"/>
+                <a:ea typeface="+mj-ea"/>
+                <a:cs typeface="+mj-cs"/>
+              </a:defRPr>
+            </a:lvl5pPr>
+            <a:lvl6pPr marL="2514600" indent="-228600" algn="l" defTabSz="457200" rtl="0" eaLnBrk="1" latinLnBrk="0" hangingPunct="1">
+              <a:spcBef>
+                <a:spcPct val="20000"/>
+              </a:spcBef>
+              <a:spcAft>
+                <a:spcPts val="600"/>
+              </a:spcAft>
+              <a:buClr>
+                <a:schemeClr val="bg2">
+                  <a:lumMod val="40000"/>
+                  <a:lumOff val="60000"/>
+                </a:schemeClr>
+              </a:buClr>
+              <a:buSzPct val="80000"/>
+              <a:buFont typeface="Wingdings 3" charset="2"/>
+              <a:buChar char=""/>
+              <a:defRPr sz="1200" b="0" i="0" kern="1200">
+                <a:solidFill>
+                  <a:schemeClr val="tx1"/>
+                </a:solidFill>
+                <a:latin typeface="+mj-lt"/>
+                <a:ea typeface="+mj-ea"/>
+                <a:cs typeface="+mj-cs"/>
+              </a:defRPr>
+            </a:lvl6pPr>
+            <a:lvl7pPr marL="2971800" indent="-228600" algn="l" defTabSz="457200" rtl="0" eaLnBrk="1" latinLnBrk="0" hangingPunct="1">
+              <a:spcBef>
+                <a:spcPct val="20000"/>
+              </a:spcBef>
+              <a:spcAft>
+                <a:spcPts val="600"/>
+              </a:spcAft>
+              <a:buClr>
+                <a:schemeClr val="bg2">
+                  <a:lumMod val="40000"/>
+                  <a:lumOff val="60000"/>
+                </a:schemeClr>
+              </a:buClr>
+              <a:buSzPct val="80000"/>
+              <a:buFont typeface="Wingdings 3" charset="2"/>
+              <a:buChar char=""/>
+              <a:defRPr sz="1200" b="0" i="0" kern="1200">
+                <a:solidFill>
+                  <a:schemeClr val="tx1"/>
+                </a:solidFill>
+                <a:latin typeface="+mj-lt"/>
+                <a:ea typeface="+mj-ea"/>
+                <a:cs typeface="+mj-cs"/>
+              </a:defRPr>
+            </a:lvl7pPr>
+            <a:lvl8pPr marL="3429000" indent="-228600" algn="l" defTabSz="457200" rtl="0" eaLnBrk="1" latinLnBrk="0" hangingPunct="1">
+              <a:spcBef>
+                <a:spcPct val="20000"/>
+              </a:spcBef>
+              <a:spcAft>
+                <a:spcPts val="600"/>
+              </a:spcAft>
+              <a:buClr>
+                <a:schemeClr val="bg2">
+                  <a:lumMod val="40000"/>
+                  <a:lumOff val="60000"/>
+                </a:schemeClr>
+              </a:buClr>
+              <a:buSzPct val="80000"/>
+              <a:buFont typeface="Wingdings 3" charset="2"/>
+              <a:buChar char=""/>
+              <a:defRPr sz="1200" b="0" i="0" kern="1200">
+                <a:solidFill>
+                  <a:schemeClr val="tx1"/>
+                </a:solidFill>
+                <a:latin typeface="+mj-lt"/>
+                <a:ea typeface="+mj-ea"/>
+                <a:cs typeface="+mj-cs"/>
+              </a:defRPr>
+            </a:lvl8pPr>
+            <a:lvl9pPr marL="3886200" indent="-228600" algn="l" defTabSz="457200" rtl="0" eaLnBrk="1" latinLnBrk="0" hangingPunct="1">
+              <a:spcBef>
+                <a:spcPct val="20000"/>
+              </a:spcBef>
+              <a:spcAft>
+                <a:spcPts val="600"/>
+              </a:spcAft>
+              <a:buClr>
+                <a:schemeClr val="bg2">
+                  <a:lumMod val="40000"/>
+                  <a:lumOff val="60000"/>
+                </a:schemeClr>
+              </a:buClr>
+              <a:buSzPct val="80000"/>
+              <a:buFont typeface="Wingdings 3" charset="2"/>
+              <a:buChar char=""/>
+              <a:defRPr sz="1200" b="0" i="0" kern="1200">
+                <a:solidFill>
+                  <a:schemeClr val="tx1"/>
+                </a:solidFill>
+                <a:latin typeface="+mj-lt"/>
+                <a:ea typeface="+mj-ea"/>
+                <a:cs typeface="+mj-cs"/>
+              </a:defRPr>
+            </a:lvl9pPr>
+          </a:lstStyle>
+          <a:p>
+            <a:r>
+              <a:rPr lang="en-US" dirty="0"/>
+              <a:t>Avg. Degree 2.096</a:t>
+            </a:r>
+          </a:p>
+          <a:p>
+            <a:r>
+              <a:rPr lang="en-US" dirty="0"/>
+              <a:t>Over 2100 classes</a:t>
+            </a:r>
+          </a:p>
+          <a:p>
+            <a:pPr lvl="1"/>
+            <a:r>
+              <a:rPr lang="en-US" dirty="0"/>
+              <a:t>0.936 Modularity</a:t>
+            </a:r>
+          </a:p>
+          <a:p>
+            <a:r>
+              <a:rPr lang="en-US" dirty="0"/>
+              <a:t>Graph Density 0.04</a:t>
+            </a:r>
+          </a:p>
+          <a:p>
+            <a:endParaRPr lang="en-US" dirty="0"/>
+          </a:p>
+          <a:p>
+            <a:endParaRPr lang="en-US" dirty="0"/>
+          </a:p>
+        </p:txBody>
+      </p:sp>
+      <p:sp>
+        <p:nvSpPr>
+          <p:cNvPr id="8" name="TextBox 7">
+            <a:extLst>
+              <a:ext uri="{FF2B5EF4-FFF2-40B4-BE49-F238E27FC236}">
+                <a16:creationId xmlns:a16="http://schemas.microsoft.com/office/drawing/2014/main" id="{9F1F87F2-7A05-43F7-AF15-B167B87EA159}"/>
+              </a:ext>
+            </a:extLst>
+          </p:cNvPr>
+          <p:cNvSpPr txBox="1"/>
+          <p:nvPr/>
+        </p:nvSpPr>
+        <p:spPr>
+          <a:xfrm>
+            <a:off x="6460245" y="1392730"/>
+            <a:ext cx="4838476" cy="646331"/>
+          </a:xfrm>
+          <a:prstGeom prst="rect">
+            <a:avLst/>
+          </a:prstGeom>
+          <a:noFill/>
+        </p:spPr>
+        <p:txBody>
+          <a:bodyPr wrap="square" rtlCol="0">
+            <a:spAutoFit/>
+          </a:bodyPr>
+          <a:lstStyle/>
+          <a:p>
+            <a:r>
+              <a:rPr lang="en-US" dirty="0" err="1"/>
+              <a:t>Fruchterman</a:t>
+            </a:r>
+            <a:r>
+              <a:rPr lang="en-US" dirty="0"/>
+              <a:t> </a:t>
+            </a:r>
+            <a:r>
+              <a:rPr lang="en-US" dirty="0" err="1"/>
+              <a:t>Reingold</a:t>
+            </a:r>
+            <a:r>
+              <a:rPr lang="en-US" dirty="0"/>
+              <a:t> Layout</a:t>
+            </a:r>
+          </a:p>
+          <a:p>
+            <a:r>
+              <a:rPr lang="en-US" dirty="0"/>
+              <a:t>Text size scaled on Eigenvector Centrality</a:t>
+            </a:r>
+          </a:p>
+        </p:txBody>
+      </p:sp>
+      <p:sp>
+        <p:nvSpPr>
+          <p:cNvPr id="9" name="TextBox 8">
+            <a:extLst>
+              <a:ext uri="{FF2B5EF4-FFF2-40B4-BE49-F238E27FC236}">
+                <a16:creationId xmlns:a16="http://schemas.microsoft.com/office/drawing/2014/main" id="{0061C364-0101-4D61-90D1-E7C313212344}"/>
+              </a:ext>
+            </a:extLst>
+          </p:cNvPr>
+          <p:cNvSpPr txBox="1"/>
+          <p:nvPr/>
+        </p:nvSpPr>
+        <p:spPr>
+          <a:xfrm>
+            <a:off x="816019" y="4313816"/>
+            <a:ext cx="3799012" cy="1754326"/>
+          </a:xfrm>
+          <a:prstGeom prst="rect">
+            <a:avLst/>
+          </a:prstGeom>
+          <a:noFill/>
+        </p:spPr>
+        <p:txBody>
+          <a:bodyPr wrap="square" rtlCol="0">
+            <a:spAutoFit/>
+          </a:bodyPr>
+          <a:lstStyle/>
+          <a:p>
+            <a:r>
+              <a:rPr lang="en-US" dirty="0"/>
+              <a:t>Most popular nodes are related to a contest of Giveaway for free things.</a:t>
+            </a:r>
+          </a:p>
+          <a:p>
+            <a:endParaRPr lang="en-US" dirty="0"/>
+          </a:p>
+          <a:p>
+            <a:r>
+              <a:rPr lang="en-US" dirty="0"/>
+              <a:t>Additionally, photography or art is popular as well.</a:t>
+            </a:r>
           </a:p>
         </p:txBody>
       </p:sp>

</xml_diff>